<commit_message>
added web chatbot examples
</commit_message>
<xml_diff>
--- a/Presentazione/presentazione_corni_chatbot.pptx
+++ b/Presentazione/presentazione_corni_chatbot.pptx
@@ -5,7 +5,7 @@
     <p:sldMasterId id="2147483648" r:id="rId1"/>
   </p:sldMasterIdLst>
   <p:notesMasterIdLst>
-    <p:notesMasterId r:id="rId15"/>
+    <p:notesMasterId r:id="rId16"/>
   </p:notesMasterIdLst>
   <p:sldIdLst>
     <p:sldId id="256" r:id="rId2"/>
@@ -17,10 +17,11 @@
     <p:sldId id="265" r:id="rId8"/>
     <p:sldId id="267" r:id="rId9"/>
     <p:sldId id="268" r:id="rId10"/>
-    <p:sldId id="269" r:id="rId11"/>
-    <p:sldId id="259" r:id="rId12"/>
-    <p:sldId id="260" r:id="rId13"/>
-    <p:sldId id="261" r:id="rId14"/>
+    <p:sldId id="270" r:id="rId11"/>
+    <p:sldId id="269" r:id="rId12"/>
+    <p:sldId id="259" r:id="rId13"/>
+    <p:sldId id="260" r:id="rId14"/>
+    <p:sldId id="261" r:id="rId15"/>
   </p:sldIdLst>
   <p:sldSz cx="12192000" cy="6858000"/>
   <p:notesSz cx="6858000" cy="9144000"/>
@@ -209,7 +210,7 @@
           <a:p>
             <a:fld id="{2E15FC1C-8A64-FA49-ACE1-0B9CB5E97710}" type="datetimeFigureOut">
               <a:rPr lang="it-IT" smtClean="0"/>
-              <a:t>24/03/19</a:t>
+              <a:t>27/03/19</a:t>
             </a:fld>
             <a:endParaRPr lang="it-IT"/>
           </a:p>
@@ -708,7 +709,7 @@
           <a:p>
             <a:fld id="{601E36F3-9E40-2941-AB6F-9D307DF64098}" type="datetimeFigureOut">
               <a:rPr lang="en-US" smtClean="0"/>
-              <a:t>3/24/19</a:t>
+              <a:t>3/27/19</a:t>
             </a:fld>
             <a:endParaRPr lang="en-US"/>
           </a:p>
@@ -906,7 +907,7 @@
           <a:p>
             <a:fld id="{601E36F3-9E40-2941-AB6F-9D307DF64098}" type="datetimeFigureOut">
               <a:rPr lang="en-US" smtClean="0"/>
-              <a:t>3/24/19</a:t>
+              <a:t>3/27/19</a:t>
             </a:fld>
             <a:endParaRPr lang="en-US"/>
           </a:p>
@@ -1114,7 +1115,7 @@
           <a:p>
             <a:fld id="{601E36F3-9E40-2941-AB6F-9D307DF64098}" type="datetimeFigureOut">
               <a:rPr lang="en-US" smtClean="0"/>
-              <a:t>3/24/19</a:t>
+              <a:t>3/27/19</a:t>
             </a:fld>
             <a:endParaRPr lang="en-US"/>
           </a:p>
@@ -1312,7 +1313,7 @@
           <a:p>
             <a:fld id="{601E36F3-9E40-2941-AB6F-9D307DF64098}" type="datetimeFigureOut">
               <a:rPr lang="en-US" smtClean="0"/>
-              <a:t>3/24/19</a:t>
+              <a:t>3/27/19</a:t>
             </a:fld>
             <a:endParaRPr lang="en-US"/>
           </a:p>
@@ -1587,7 +1588,7 @@
           <a:p>
             <a:fld id="{601E36F3-9E40-2941-AB6F-9D307DF64098}" type="datetimeFigureOut">
               <a:rPr lang="en-US" smtClean="0"/>
-              <a:t>3/24/19</a:t>
+              <a:t>3/27/19</a:t>
             </a:fld>
             <a:endParaRPr lang="en-US"/>
           </a:p>
@@ -1852,7 +1853,7 @@
           <a:p>
             <a:fld id="{601E36F3-9E40-2941-AB6F-9D307DF64098}" type="datetimeFigureOut">
               <a:rPr lang="en-US" smtClean="0"/>
-              <a:t>3/24/19</a:t>
+              <a:t>3/27/19</a:t>
             </a:fld>
             <a:endParaRPr lang="en-US"/>
           </a:p>
@@ -2264,7 +2265,7 @@
           <a:p>
             <a:fld id="{601E36F3-9E40-2941-AB6F-9D307DF64098}" type="datetimeFigureOut">
               <a:rPr lang="en-US" smtClean="0"/>
-              <a:t>3/24/19</a:t>
+              <a:t>3/27/19</a:t>
             </a:fld>
             <a:endParaRPr lang="en-US"/>
           </a:p>
@@ -2405,7 +2406,7 @@
           <a:p>
             <a:fld id="{601E36F3-9E40-2941-AB6F-9D307DF64098}" type="datetimeFigureOut">
               <a:rPr lang="en-US" smtClean="0"/>
-              <a:t>3/24/19</a:t>
+              <a:t>3/27/19</a:t>
             </a:fld>
             <a:endParaRPr lang="en-US"/>
           </a:p>
@@ -2518,7 +2519,7 @@
           <a:p>
             <a:fld id="{601E36F3-9E40-2941-AB6F-9D307DF64098}" type="datetimeFigureOut">
               <a:rPr lang="en-US" smtClean="0"/>
-              <a:t>3/24/19</a:t>
+              <a:t>3/27/19</a:t>
             </a:fld>
             <a:endParaRPr lang="en-US"/>
           </a:p>
@@ -2829,7 +2830,7 @@
           <a:p>
             <a:fld id="{601E36F3-9E40-2941-AB6F-9D307DF64098}" type="datetimeFigureOut">
               <a:rPr lang="en-US" smtClean="0"/>
-              <a:t>3/24/19</a:t>
+              <a:t>3/27/19</a:t>
             </a:fld>
             <a:endParaRPr lang="en-US"/>
           </a:p>
@@ -3117,7 +3118,7 @@
           <a:p>
             <a:fld id="{601E36F3-9E40-2941-AB6F-9D307DF64098}" type="datetimeFigureOut">
               <a:rPr lang="en-US" smtClean="0"/>
-              <a:t>3/24/19</a:t>
+              <a:t>3/27/19</a:t>
             </a:fld>
             <a:endParaRPr lang="en-US"/>
           </a:p>
@@ -3358,7 +3359,7 @@
           <a:p>
             <a:fld id="{601E36F3-9E40-2941-AB6F-9D307DF64098}" type="datetimeFigureOut">
               <a:rPr lang="en-US" smtClean="0"/>
-              <a:t>3/24/19</a:t>
+              <a:t>3/27/19</a:t>
             </a:fld>
             <a:endParaRPr lang="en-US"/>
           </a:p>
@@ -3959,6 +3960,126 @@
 <file path=ppt/slides/slide10.xml><?xml version="1.0" encoding="utf-8"?>
 <p:sld xmlns:a="http://schemas.openxmlformats.org/drawingml/2006/main" xmlns:r="http://schemas.openxmlformats.org/officeDocument/2006/relationships" xmlns:p="http://schemas.openxmlformats.org/presentationml/2006/main">
   <p:cSld>
+    <p:spTree>
+      <p:nvGrpSpPr>
+        <p:cNvPr id="1" name=""/>
+        <p:cNvGrpSpPr/>
+        <p:nvPr/>
+      </p:nvGrpSpPr>
+      <p:grpSpPr>
+        <a:xfrm>
+          <a:off x="0" y="0"/>
+          <a:ext cx="0" cy="0"/>
+          <a:chOff x="0" y="0"/>
+          <a:chExt cx="0" cy="0"/>
+        </a:xfrm>
+      </p:grpSpPr>
+      <p:pic>
+        <p:nvPicPr>
+          <p:cNvPr id="15" name="Picture 14">
+            <a:extLst>
+              <a:ext uri="{FF2B5EF4-FFF2-40B4-BE49-F238E27FC236}">
+                <a16:creationId xmlns:a16="http://schemas.microsoft.com/office/drawing/2014/main" id="{026BEE09-DA0D-B647-B22A-CBF2C2FD6AF7}"/>
+              </a:ext>
+            </a:extLst>
+          </p:cNvPr>
+          <p:cNvPicPr>
+            <a:picLocks noChangeAspect="1"/>
+          </p:cNvPicPr>
+          <p:nvPr/>
+        </p:nvPicPr>
+        <p:blipFill>
+          <a:blip r:embed="rId2"/>
+          <a:stretch>
+            <a:fillRect/>
+          </a:stretch>
+        </p:blipFill>
+        <p:spPr>
+          <a:xfrm>
+            <a:off x="5611893" y="47767"/>
+            <a:ext cx="3943465" cy="4284861"/>
+          </a:xfrm>
+          <a:prstGeom prst="rect">
+            <a:avLst/>
+          </a:prstGeom>
+        </p:spPr>
+      </p:pic>
+      <p:pic>
+        <p:nvPicPr>
+          <p:cNvPr id="7" name="Picture 6">
+            <a:extLst>
+              <a:ext uri="{FF2B5EF4-FFF2-40B4-BE49-F238E27FC236}">
+                <a16:creationId xmlns:a16="http://schemas.microsoft.com/office/drawing/2014/main" id="{5CD30F54-DC1C-9D4A-A001-F194F9FC70B9}"/>
+              </a:ext>
+            </a:extLst>
+          </p:cNvPr>
+          <p:cNvPicPr>
+            <a:picLocks noChangeAspect="1"/>
+          </p:cNvPicPr>
+          <p:nvPr/>
+        </p:nvPicPr>
+        <p:blipFill>
+          <a:blip r:embed="rId3"/>
+          <a:stretch>
+            <a:fillRect/>
+          </a:stretch>
+        </p:blipFill>
+        <p:spPr>
+          <a:xfrm>
+            <a:off x="1337481" y="2206022"/>
+            <a:ext cx="10740788" cy="4556444"/>
+          </a:xfrm>
+          <a:prstGeom prst="rect">
+            <a:avLst/>
+          </a:prstGeom>
+        </p:spPr>
+      </p:pic>
+      <p:pic>
+        <p:nvPicPr>
+          <p:cNvPr id="17" name="Picture 16">
+            <a:extLst>
+              <a:ext uri="{FF2B5EF4-FFF2-40B4-BE49-F238E27FC236}">
+                <a16:creationId xmlns:a16="http://schemas.microsoft.com/office/drawing/2014/main" id="{32190CAD-4975-1F4A-AB65-49488C70F6C0}"/>
+              </a:ext>
+            </a:extLst>
+          </p:cNvPr>
+          <p:cNvPicPr>
+            <a:picLocks noChangeAspect="1"/>
+          </p:cNvPicPr>
+          <p:nvPr/>
+        </p:nvPicPr>
+        <p:blipFill>
+          <a:blip r:embed="rId4"/>
+          <a:stretch>
+            <a:fillRect/>
+          </a:stretch>
+        </p:blipFill>
+        <p:spPr>
+          <a:xfrm>
+            <a:off x="113731" y="47767"/>
+            <a:ext cx="3979274" cy="6762466"/>
+          </a:xfrm>
+          <a:prstGeom prst="rect">
+            <a:avLst/>
+          </a:prstGeom>
+        </p:spPr>
+      </p:pic>
+    </p:spTree>
+    <p:extLst>
+      <p:ext uri="{BB962C8B-B14F-4D97-AF65-F5344CB8AC3E}">
+        <p14:creationId xmlns:p14="http://schemas.microsoft.com/office/powerpoint/2010/main" val="1222612684"/>
+      </p:ext>
+    </p:extLst>
+  </p:cSld>
+  <p:clrMapOvr>
+    <a:masterClrMapping/>
+  </p:clrMapOvr>
+</p:sld>
+</file>
+
+<file path=ppt/slides/slide11.xml><?xml version="1.0" encoding="utf-8"?>
+<p:sld xmlns:a="http://schemas.openxmlformats.org/drawingml/2006/main" xmlns:r="http://schemas.openxmlformats.org/officeDocument/2006/relationships" xmlns:p="http://schemas.openxmlformats.org/presentationml/2006/main">
+  <p:cSld>
     <p:bg>
       <p:bgPr>
         <a:solidFill>
@@ -4191,7 +4312,7 @@
 </p:sld>
 </file>
 
-<file path=ppt/slides/slide11.xml><?xml version="1.0" encoding="utf-8"?>
+<file path=ppt/slides/slide12.xml><?xml version="1.0" encoding="utf-8"?>
 <p:sld xmlns:a="http://schemas.openxmlformats.org/drawingml/2006/main" xmlns:r="http://schemas.openxmlformats.org/officeDocument/2006/relationships" xmlns:p="http://schemas.openxmlformats.org/presentationml/2006/main">
   <p:cSld>
     <p:bg>
@@ -4528,7 +4649,7 @@
 </p:sld>
 </file>
 
-<file path=ppt/slides/slide12.xml><?xml version="1.0" encoding="utf-8"?>
+<file path=ppt/slides/slide13.xml><?xml version="1.0" encoding="utf-8"?>
 <p:sld xmlns:a="http://schemas.openxmlformats.org/drawingml/2006/main" xmlns:r="http://schemas.openxmlformats.org/officeDocument/2006/relationships" xmlns:p="http://schemas.openxmlformats.org/presentationml/2006/main">
   <p:cSld>
     <p:bg>
@@ -5401,7 +5522,7 @@
 </p:sld>
 </file>
 
-<file path=ppt/slides/slide13.xml><?xml version="1.0" encoding="utf-8"?>
+<file path=ppt/slides/slide14.xml><?xml version="1.0" encoding="utf-8"?>
 <p:sld xmlns:a="http://schemas.openxmlformats.org/drawingml/2006/main" xmlns:r="http://schemas.openxmlformats.org/officeDocument/2006/relationships" xmlns:p="http://schemas.openxmlformats.org/presentationml/2006/main">
   <p:cSld>
     <p:spTree>

</xml_diff>